<commit_message>
added hyperlinks support to json->pptx presentations
</commit_message>
<xml_diff>
--- a/temp/test_output_option_5.pptx
+++ b/temp/test_output_option_5.pptx
@@ -15,27 +15,20 @@
     <p:sldId id="261" r:id="rId13"/>
     <p:sldId id="262" r:id="rId14"/>
     <p:sldId id="263" r:id="rId15"/>
-    <p:sldId id="264" r:id="rId16"/>
-    <p:sldId id="265" r:id="rId17"/>
   </p:sldIdLst>
   <p:sldSz cx="9906000" cy="6858000"/>
   <p:notesSz cx="6858000" cy="9144000"/>
   <p:extLst>
     <p:ext uri="{521415D9-36F7-43E2-AB2F-B90AF26B5E84}">
       <p14:sectionLst xmlns:p14="http://schemas.microsoft.com/office/powerpoint/2010/main">
-        <p14:section name="What is Dungeons And Dragons" id="{3C6C907E-052A-4105-B899-56A8F214E79E}">
+        <p14:section name="What is Dungeons And Dragons" id="{5AFCE455-F710-4F84-B086-02CA35A3BF2A}">
           <p14:sldIdLst>
             <p14:sldId id="258"/>
           </p14:sldIdLst>
         </p14:section>
-        <p14:section name="What is DD Adventurers League" id="{E2BFE927-F99A-4845-8220-F98345A28D18}">
+        <p14:section name="Overview" id="{937067D7-687F-4FE0-AD4D-27929F7A1598}">
           <p14:sldIdLst>
-            <p14:sldId id="262"/>
-          </p14:sldIdLst>
-        </p14:section>
-        <p14:section name="Impact on the Renewal of Interest in DD" id="{5B513EE4-0852-48EF-9B31-5F770DC38330}">
-          <p14:sldIdLst>
-            <p14:sldId id="264"/>
+            <p14:sldId id="261"/>
           </p14:sldIdLst>
         </p14:section>
       </p14:sectionLst>
@@ -845,114 +838,6 @@
 </file>
 
 <file path=ppt/notesSlides/notesSlide7.xml><?xml version="1.0" encoding="utf-8"?>
-<p:notes xmlns:a="http://schemas.openxmlformats.org/drawingml/2006/main" xmlns:p="http://schemas.openxmlformats.org/presentationml/2006/main" xmlns:r="http://schemas.openxmlformats.org/officeDocument/2006/relationships">
-  <p:cSld>
-    <p:spTree>
-      <p:nvGrpSpPr>
-        <p:cNvPr id="1" name=""/>
-        <p:cNvGrpSpPr/>
-        <p:nvPr/>
-      </p:nvGrpSpPr>
-      <p:grpSpPr>
-        <a:xfrm>
-          <a:off x="0" y="0"/>
-          <a:ext cx="0" cy="0"/>
-          <a:chOff x="0" y="0"/>
-          <a:chExt cx="0" cy="0"/>
-        </a:xfrm>
-      </p:grpSpPr>
-      <p:sp>
-        <p:nvSpPr>
-          <p:cNvPr id="2" name="Slide Image Placeholder 1"/>
-          <p:cNvSpPr>
-            <a:spLocks noGrp="1"/>
-          </p:cNvSpPr>
-          <p:nvPr>
-            <p:ph type="sldImg"/>
-          </p:nvPr>
-        </p:nvSpPr>
-        <p:spPr/>
-      </p:sp>
-      <p:sp>
-        <p:nvSpPr>
-          <p:cNvPr id="3" name="Notes Placeholder 2"/>
-          <p:cNvSpPr>
-            <a:spLocks noGrp="1"/>
-          </p:cNvSpPr>
-          <p:nvPr>
-            <p:ph type="body" idx="1" sz="quarter"/>
-          </p:nvPr>
-        </p:nvSpPr>
-        <p:spPr/>
-        <p:txBody>
-          <a:bodyPr/>
-          <a:lstStyle/>
-          <a:p/>
-        </p:txBody>
-      </p:sp>
-    </p:spTree>
-  </p:cSld>
-  <p:clrMapOvr>
-    <a:masterClrMapping/>
-  </p:clrMapOvr>
-</p:notes>
-</file>
-
-<file path=ppt/notesSlides/notesSlide8.xml><?xml version="1.0" encoding="utf-8"?>
-<p:notes xmlns:a="http://schemas.openxmlformats.org/drawingml/2006/main" xmlns:p="http://schemas.openxmlformats.org/presentationml/2006/main" xmlns:r="http://schemas.openxmlformats.org/officeDocument/2006/relationships">
-  <p:cSld>
-    <p:spTree>
-      <p:nvGrpSpPr>
-        <p:cNvPr id="1" name=""/>
-        <p:cNvGrpSpPr/>
-        <p:nvPr/>
-      </p:nvGrpSpPr>
-      <p:grpSpPr>
-        <a:xfrm>
-          <a:off x="0" y="0"/>
-          <a:ext cx="0" cy="0"/>
-          <a:chOff x="0" y="0"/>
-          <a:chExt cx="0" cy="0"/>
-        </a:xfrm>
-      </p:grpSpPr>
-      <p:sp>
-        <p:nvSpPr>
-          <p:cNvPr id="2" name="Slide Image Placeholder 1"/>
-          <p:cNvSpPr>
-            <a:spLocks noGrp="1"/>
-          </p:cNvSpPr>
-          <p:nvPr>
-            <p:ph type="sldImg"/>
-          </p:nvPr>
-        </p:nvSpPr>
-        <p:spPr/>
-      </p:sp>
-      <p:sp>
-        <p:nvSpPr>
-          <p:cNvPr id="3" name="Notes Placeholder 2"/>
-          <p:cNvSpPr>
-            <a:spLocks noGrp="1"/>
-          </p:cNvSpPr>
-          <p:nvPr>
-            <p:ph type="body" idx="1" sz="quarter"/>
-          </p:nvPr>
-        </p:nvSpPr>
-        <p:spPr/>
-        <p:txBody>
-          <a:bodyPr/>
-          <a:lstStyle/>
-          <a:p/>
-        </p:txBody>
-      </p:sp>
-    </p:spTree>
-  </p:cSld>
-  <p:clrMapOvr>
-    <a:masterClrMapping/>
-  </p:clrMapOvr>
-</p:notes>
-</file>
-
-<file path=ppt/notesSlides/notesSlide9.xml><?xml version="1.0" encoding="utf-8"?>
 <p:notes xmlns:a="http://schemas.openxmlformats.org/drawingml/2006/main" xmlns:p="http://schemas.openxmlformats.org/presentationml/2006/main" xmlns:r="http://schemas.openxmlformats.org/officeDocument/2006/relationships">
   <p:cSld>
     <p:spTree>
@@ -2601,7 +2486,139 @@
 </p:sldMaster>
 </file>
 
-<file path=ppt/slides/slide10.xml><?xml version="1.0" encoding="utf-8"?>
+<file path=ppt/slides/slide2.xml><?xml version="1.0" encoding="utf-8"?>
+<p:sld xmlns:a="http://schemas.openxmlformats.org/drawingml/2006/main" xmlns:p="http://schemas.openxmlformats.org/presentationml/2006/main" xmlns:r="http://schemas.openxmlformats.org/officeDocument/2006/relationships">
+  <p:cSld>
+    <p:spTree>
+      <p:nvGrpSpPr>
+        <p:cNvPr id="1" name=""/>
+        <p:cNvGrpSpPr/>
+        <p:nvPr/>
+      </p:nvGrpSpPr>
+      <p:grpSpPr/>
+      <p:sp>
+        <p:nvSpPr>
+          <p:cNvPr id="2" name="Title 1"/>
+          <p:cNvSpPr>
+            <a:spLocks noGrp="1"/>
+          </p:cNvSpPr>
+          <p:nvPr>
+            <p:ph type="title"/>
+          </p:nvPr>
+        </p:nvSpPr>
+        <p:spPr/>
+        <p:txBody>
+          <a:bodyPr/>
+          <a:lstStyle/>
+          <a:p>
+            <a:pPr>
+              <a:defRPr sz="4000"/>
+            </a:pPr>
+            <a:r>
+              <a:t>Dungeons And Dragons</a:t>
+            </a:r>
+          </a:p>
+        </p:txBody>
+      </p:sp>
+      <p:sp>
+        <p:nvSpPr>
+          <p:cNvPr id="3" name="Text Placeholder 2"/>
+          <p:cNvSpPr>
+            <a:spLocks noGrp="1"/>
+          </p:cNvSpPr>
+          <p:nvPr>
+            <p:ph type="body" idx="1" sz="half"/>
+          </p:nvPr>
+        </p:nvSpPr>
+        <p:spPr/>
+        <p:txBody>
+          <a:bodyPr/>
+          <a:lstStyle/>
+          <a:p>
+            <a:pPr>
+              <a:defRPr sz="2800"/>
+            </a:pPr>
+            <a:r>
+              <a:t>An Introduction to the Popular Tabletop Role-Playing Game</a:t>
+            </a:r>
+          </a:p>
+        </p:txBody>
+      </p:sp>
+    </p:spTree>
+  </p:cSld>
+  <p:clrMapOvr>
+    <a:masterClrMapping/>
+  </p:clrMapOvr>
+</p:sld>
+</file>
+
+<file path=ppt/slides/slide3.xml><?xml version="1.0" encoding="utf-8"?>
+<p:sld xmlns:a="http://schemas.openxmlformats.org/drawingml/2006/main" xmlns:p="http://schemas.openxmlformats.org/presentationml/2006/main" xmlns:r="http://schemas.openxmlformats.org/officeDocument/2006/relationships">
+  <p:cSld>
+    <p:spTree>
+      <p:nvGrpSpPr>
+        <p:cNvPr id="1" name=""/>
+        <p:cNvGrpSpPr/>
+        <p:nvPr/>
+      </p:nvGrpSpPr>
+      <p:grpSpPr/>
+      <p:sp>
+        <p:nvSpPr>
+          <p:cNvPr id="2" name="Title 1"/>
+          <p:cNvSpPr>
+            <a:spLocks noGrp="1"/>
+          </p:cNvSpPr>
+          <p:nvPr>
+            <p:ph type="title"/>
+          </p:nvPr>
+        </p:nvSpPr>
+        <p:spPr/>
+        <p:txBody>
+          <a:bodyPr/>
+          <a:lstStyle/>
+          <a:p>
+            <a:pPr>
+              <a:defRPr sz="4000"/>
+            </a:pPr>
+            <a:r>
+              <a:t>What is Dungeons And Dragons?</a:t>
+            </a:r>
+          </a:p>
+        </p:txBody>
+      </p:sp>
+      <p:sp>
+        <p:nvSpPr>
+          <p:cNvPr id="3" name="Text Placeholder 2"/>
+          <p:cNvSpPr>
+            <a:spLocks noGrp="1"/>
+          </p:cNvSpPr>
+          <p:nvPr>
+            <p:ph type="body" idx="1"/>
+          </p:nvPr>
+        </p:nvSpPr>
+        <p:spPr/>
+        <p:txBody>
+          <a:bodyPr/>
+          <a:lstStyle/>
+          <a:p>
+            <a:pPr>
+              <a:defRPr sz="2800"/>
+            </a:pPr>
+            <a:r>
+              <a:t>A Brief Overview</a:t>
+            </a:r>
+          </a:p>
+        </p:txBody>
+      </p:sp>
+    </p:spTree>
+  </p:cSld>
+  <p:clrMapOvr>
+    <a:masterClrMapping/>
+  </p:clrMapOvr>
+</p:sld>
+</file>
+
+<file path=ppt/slides/slide4.xml><?xml version="1.0" encoding="utf-8"?>
 <p:sld xmlns:a="http://schemas.openxmlformats.org/drawingml/2006/main" xmlns:p="http://schemas.openxmlformats.org/presentationml/2006/main" xmlns:r="http://schemas.openxmlformats.org/officeDocument/2006/relationships">
   <p:cSld>
     <p:spTree>
@@ -2680,7 +2697,7 @@
               <a:defRPr sz="3000"/>
             </a:pPr>
             <a:r>
-              <a:t>Factors Contributing to Renewal</a:t>
+              <a:t>Key Points</a:t>
             </a:r>
           </a:p>
         </p:txBody>
@@ -2711,7 +2728,7 @@
               <a:defRPr sz="1800"/>
             </a:pPr>
             <a:r>
-              <a:t>Increased accessibility for new players</a:t>
+              <a:t>Dungeons &amp; Dragons (D&amp;D) is a fantasy tabletop role-playing game (RPG)</a:t>
             </a:r>
           </a:p>
           <a:p>
@@ -2719,7 +2736,7 @@
               <a:defRPr sz="1800"/>
             </a:pPr>
             <a:r>
-              <a:t>Engaging organized play events and conventions</a:t>
+              <a:t>Players create characters and embark on adventures guided by a Dungeon Master (DM)</a:t>
             </a:r>
           </a:p>
           <a:p>
@@ -2727,7 +2744,7 @@
               <a:defRPr sz="1800"/>
             </a:pPr>
             <a:r>
-              <a:t>Continuously evolving storylines and content</a:t>
+              <a:t>It involves storytelling, exploration, and combat using dice rolls to determine outcomes</a:t>
             </a:r>
           </a:p>
         </p:txBody>
@@ -2759,7 +2776,7 @@
               <a:defRPr sz="2000"/>
             </a:pPr>
             <a:r>
-              <a:t>Community Testimonials</a:t>
+              <a:t>Gameplay</a:t>
             </a:r>
           </a:p>
         </p:txBody>
@@ -2791,7 +2808,7 @@
               <a:defRPr sz="1800"/>
             </a:pPr>
             <a:r>
-              <a:t>Positive impact on player engagement and retention</a:t>
+              <a:t>Character creation involves choosing races, classes, and abilities</a:t>
             </a:r>
           </a:p>
           <a:p>
@@ -2799,244 +2816,7 @@
               <a:defRPr sz="1800"/>
             </a:pPr>
             <a:r>
-              <a:t>Fostering a sense of belonging in gaming communities</a:t>
-            </a:r>
-          </a:p>
-          <a:p>
-            <a:pPr>
-              <a:defRPr sz="1800"/>
-            </a:pPr>
-            <a:r>
-              <a:t>Inspiring creative storytelling and role-playing</a:t>
-            </a:r>
-          </a:p>
-        </p:txBody>
-      </p:sp>
-    </p:spTree>
-  </p:cSld>
-  <p:clrMapOvr>
-    <a:masterClrMapping/>
-  </p:clrMapOvr>
-</p:sld>
-</file>
-
-<file path=ppt/slides/slide2.xml><?xml version="1.0" encoding="utf-8"?>
-<p:sld xmlns:a="http://schemas.openxmlformats.org/drawingml/2006/main" xmlns:p="http://schemas.openxmlformats.org/presentationml/2006/main" xmlns:r="http://schemas.openxmlformats.org/officeDocument/2006/relationships">
-  <p:cSld>
-    <p:spTree>
-      <p:nvGrpSpPr>
-        <p:cNvPr id="1" name=""/>
-        <p:cNvGrpSpPr/>
-        <p:nvPr/>
-      </p:nvGrpSpPr>
-      <p:grpSpPr/>
-      <p:sp>
-        <p:nvSpPr>
-          <p:cNvPr id="2" name="Title 1"/>
-          <p:cNvSpPr>
-            <a:spLocks noGrp="1"/>
-          </p:cNvSpPr>
-          <p:nvPr>
-            <p:ph type="title"/>
-          </p:nvPr>
-        </p:nvSpPr>
-        <p:spPr/>
-        <p:txBody>
-          <a:bodyPr/>
-          <a:lstStyle/>
-          <a:p>
-            <a:pPr>
-              <a:defRPr sz="4000"/>
-            </a:pPr>
-            <a:r>
-              <a:t>Dungeons And Dragons</a:t>
-            </a:r>
-          </a:p>
-        </p:txBody>
-      </p:sp>
-      <p:sp>
-        <p:nvSpPr>
-          <p:cNvPr id="3" name="Text Placeholder 2"/>
-          <p:cNvSpPr>
-            <a:spLocks noGrp="1"/>
-          </p:cNvSpPr>
-          <p:nvPr>
-            <p:ph type="body" idx="1" sz="half"/>
-          </p:nvPr>
-        </p:nvSpPr>
-        <p:spPr/>
-        <p:txBody>
-          <a:bodyPr/>
-          <a:lstStyle/>
-          <a:p>
-            <a:pPr>
-              <a:defRPr sz="2800"/>
-            </a:pPr>
-            <a:r>
-              <a:t>A fantasy tabletop role-playing game</a:t>
-            </a:r>
-          </a:p>
-        </p:txBody>
-      </p:sp>
-    </p:spTree>
-  </p:cSld>
-  <p:clrMapOvr>
-    <a:masterClrMapping/>
-  </p:clrMapOvr>
-</p:sld>
-</file>
-
-<file path=ppt/slides/slide3.xml><?xml version="1.0" encoding="utf-8"?>
-<p:sld xmlns:a="http://schemas.openxmlformats.org/drawingml/2006/main" xmlns:p="http://schemas.openxmlformats.org/presentationml/2006/main" xmlns:r="http://schemas.openxmlformats.org/officeDocument/2006/relationships">
-  <p:cSld>
-    <p:spTree>
-      <p:nvGrpSpPr>
-        <p:cNvPr id="1" name=""/>
-        <p:cNvGrpSpPr/>
-        <p:nvPr/>
-      </p:nvGrpSpPr>
-      <p:grpSpPr/>
-      <p:sp>
-        <p:nvSpPr>
-          <p:cNvPr id="2" name="Title 1"/>
-          <p:cNvSpPr>
-            <a:spLocks noGrp="1"/>
-          </p:cNvSpPr>
-          <p:nvPr>
-            <p:ph type="title"/>
-          </p:nvPr>
-        </p:nvSpPr>
-        <p:spPr/>
-        <p:txBody>
-          <a:bodyPr/>
-          <a:lstStyle/>
-          <a:p>
-            <a:pPr>
-              <a:defRPr sz="4000"/>
-            </a:pPr>
-            <a:r>
-              <a:t>What is Dungeons And Dragons?</a:t>
-            </a:r>
-          </a:p>
-        </p:txBody>
-      </p:sp>
-      <p:sp>
-        <p:nvSpPr>
-          <p:cNvPr id="3" name="Text Placeholder 2"/>
-          <p:cNvSpPr>
-            <a:spLocks noGrp="1"/>
-          </p:cNvSpPr>
-          <p:nvPr>
-            <p:ph type="body" idx="1"/>
-          </p:nvPr>
-        </p:nvSpPr>
-        <p:spPr/>
-        <p:txBody>
-          <a:bodyPr/>
-          <a:lstStyle/>
-          <a:p>
-            <a:pPr>
-              <a:defRPr sz="2800"/>
-            </a:pPr>
-            <a:r>
-              <a:t>D&amp;D is a collaborative storytelling game set in a fantasy world</a:t>
-            </a:r>
-          </a:p>
-        </p:txBody>
-      </p:sp>
-    </p:spTree>
-  </p:cSld>
-  <p:clrMapOvr>
-    <a:masterClrMapping/>
-  </p:clrMapOvr>
-</p:sld>
-</file>
-
-<file path=ppt/slides/slide4.xml><?xml version="1.0" encoding="utf-8"?>
-<p:sld xmlns:a="http://schemas.openxmlformats.org/drawingml/2006/main" xmlns:p="http://schemas.openxmlformats.org/presentationml/2006/main" xmlns:r="http://schemas.openxmlformats.org/officeDocument/2006/relationships">
-  <p:cSld>
-    <p:spTree>
-      <p:nvGrpSpPr>
-        <p:cNvPr id="1" name=""/>
-        <p:cNvGrpSpPr/>
-        <p:nvPr/>
-      </p:nvGrpSpPr>
-      <p:grpSpPr/>
-      <p:sp>
-        <p:nvSpPr>
-          <p:cNvPr id="2" name="Title 1"/>
-          <p:cNvSpPr>
-            <a:spLocks noGrp="1"/>
-          </p:cNvSpPr>
-          <p:nvPr>
-            <p:ph type="title"/>
-          </p:nvPr>
-        </p:nvSpPr>
-        <p:spPr>
-          <a:xfrm>
-            <a:off x="182880" y="182880"/>
-            <a:ext cx="9540240" cy="381000"/>
-          </a:xfrm>
-        </p:spPr>
-        <p:txBody>
-          <a:bodyPr anchor="t"/>
-          <a:lstStyle/>
-          <a:p>
-            <a:pPr algn="l">
-              <a:spcAft>
-                <a:spcPts val="0"/>
-              </a:spcAft>
-              <a:defRPr sz="3000"/>
-            </a:pPr>
-            <a:r>
-              <a:t>Key Features</a:t>
-            </a:r>
-          </a:p>
-        </p:txBody>
-      </p:sp>
-      <p:sp>
-        <p:nvSpPr>
-          <p:cNvPr id="3" name="Text Placeholder 2"/>
-          <p:cNvSpPr>
-            <a:spLocks noGrp="1"/>
-          </p:cNvSpPr>
-          <p:nvPr>
-            <p:ph type="body" idx="1" sz="half"/>
-          </p:nvPr>
-        </p:nvSpPr>
-        <p:spPr>
-          <a:xfrm>
-            <a:off x="182880" y="838200"/>
-            <a:ext cx="9540240" cy="5654040"/>
-          </a:xfrm>
-        </p:spPr>
-        <p:txBody>
-          <a:bodyPr>
-            <a:normAutofit/>
-          </a:bodyPr>
-          <a:lstStyle/>
-          <a:p>
-            <a:pPr>
-              <a:defRPr sz="1800"/>
-            </a:pPr>
-            <a:r>
-              <a:t>Players create characters with unique abilities</a:t>
-            </a:r>
-          </a:p>
-          <a:p>
-            <a:pPr>
-              <a:defRPr sz="1800"/>
-            </a:pPr>
-            <a:r>
-              <a:t>Game Master guides the narrative and controls the world</a:t>
-            </a:r>
-          </a:p>
-          <a:p>
-            <a:pPr>
-              <a:defRPr sz="1800"/>
-            </a:pPr>
-            <a:r>
-              <a:t>Uses dice rolls to determine outcomes</a:t>
+              <a:t>Players collaborate to solve puzzles, battle monsters, and complete quests</a:t>
             </a:r>
           </a:p>
         </p:txBody>
@@ -3069,24 +2849,16 @@
             <p:ph type="title"/>
           </p:nvPr>
         </p:nvSpPr>
-        <p:spPr>
-          <a:xfrm>
-            <a:off x="182880" y="182880"/>
-            <a:ext cx="9540240" cy="381000"/>
-          </a:xfrm>
-        </p:spPr>
+        <p:spPr/>
         <p:txBody>
-          <a:bodyPr anchor="t"/>
+          <a:bodyPr/>
           <a:lstStyle/>
           <a:p>
-            <a:pPr algn="l">
-              <a:spcAft>
-                <a:spcPts val="0"/>
-              </a:spcAft>
-              <a:defRPr sz="3000"/>
+            <a:pPr>
+              <a:defRPr sz="4000"/>
             </a:pPr>
             <a:r>
-              <a:t>Gameplay</a:t>
+              <a:t>Dungeons And Dragons Adventurers League</a:t>
             </a:r>
           </a:p>
         </p:txBody>
@@ -3101,39 +2873,16 @@
             <p:ph type="body" idx="1" sz="half"/>
           </p:nvPr>
         </p:nvSpPr>
-        <p:spPr>
-          <a:xfrm>
-            <a:off x="182880" y="838200"/>
-            <a:ext cx="9540240" cy="5654040"/>
-          </a:xfrm>
-        </p:spPr>
+        <p:spPr/>
         <p:txBody>
-          <a:bodyPr>
-            <a:normAutofit/>
-          </a:bodyPr>
+          <a:bodyPr/>
           <a:lstStyle/>
           <a:p>
             <a:pPr>
-              <a:defRPr sz="1800"/>
+              <a:defRPr sz="2800"/>
             </a:pPr>
             <a:r>
-              <a:t>Players interact with the world through role-playing</a:t>
-            </a:r>
-          </a:p>
-          <a:p>
-            <a:pPr>
-              <a:defRPr sz="1800"/>
-            </a:pPr>
-            <a:r>
-              <a:t>Combat is resolved using dice rolls and character abilities</a:t>
-            </a:r>
-          </a:p>
-          <a:p>
-            <a:pPr>
-              <a:defRPr sz="1800"/>
-            </a:pPr>
-            <a:r>
-              <a:t>Collaborative storytelling creates immersive adventures</a:t>
+              <a:t>Renewal of Interest in the Game</a:t>
             </a:r>
           </a:p>
         </p:txBody>
@@ -3175,7 +2924,7 @@
               <a:defRPr sz="4000"/>
             </a:pPr>
             <a:r>
-              <a:t>Dungeons And Dragons Adventurers League</a:t>
+              <a:t>Overview</a:t>
             </a:r>
           </a:p>
         </p:txBody>
@@ -3187,7 +2936,7 @@
             <a:spLocks noGrp="1"/>
           </p:cNvSpPr>
           <p:nvPr>
-            <p:ph type="body" idx="1" sz="half"/>
+            <p:ph type="body" idx="1"/>
           </p:nvPr>
         </p:nvSpPr>
         <p:spPr/>
@@ -3199,7 +2948,7 @@
               <a:defRPr sz="2800"/>
             </a:pPr>
             <a:r>
-              <a:t>Contribution to the renewal of interest in the game</a:t>
+              <a:t>░░░░░░░░░░░░░░░░░░░░░░░░░</a:t>
             </a:r>
           </a:p>
         </p:txBody>
@@ -3232,13 +2981,21 @@
             <p:ph type="title"/>
           </p:nvPr>
         </p:nvSpPr>
-        <p:spPr/>
+        <p:spPr>
+          <a:xfrm>
+            <a:off x="182880" y="182880"/>
+            <a:ext cx="9540240" cy="381000"/>
+          </a:xfrm>
+        </p:spPr>
         <p:txBody>
-          <a:bodyPr/>
+          <a:bodyPr anchor="t"/>
           <a:lstStyle/>
           <a:p>
-            <a:pPr>
-              <a:defRPr sz="4000"/>
+            <a:pPr algn="l">
+              <a:spcAft>
+                <a:spcPts val="0"/>
+              </a:spcAft>
+              <a:defRPr sz="3000"/>
             </a:pPr>
             <a:r>
               <a:t>What is D🫰D Adventurers League?</a:t>
@@ -3253,19 +3010,42 @@
             <a:spLocks noGrp="1"/>
           </p:cNvSpPr>
           <p:nvPr>
-            <p:ph type="body" idx="1"/>
+            <p:ph type="body" idx="1" sz="half"/>
           </p:nvPr>
         </p:nvSpPr>
-        <p:spPr/>
+        <p:spPr>
+          <a:xfrm>
+            <a:off x="182880" y="838200"/>
+            <a:ext cx="9540240" cy="5654040"/>
+          </a:xfrm>
+        </p:spPr>
         <p:txBody>
-          <a:bodyPr/>
+          <a:bodyPr>
+            <a:normAutofit/>
+          </a:bodyPr>
           <a:lstStyle/>
           <a:p>
             <a:pPr>
-              <a:defRPr sz="2800"/>
+              <a:defRPr sz="1800"/>
             </a:pPr>
             <a:r>
-              <a:t>An organized play program for Dungeons &amp; Dragons</a:t>
+              <a:t>Organized play program for Dungeons &amp; Dragons</a:t>
+            </a:r>
+          </a:p>
+          <a:p>
+            <a:pPr>
+              <a:defRPr sz="1800"/>
+            </a:pPr>
+            <a:r>
+              <a:t>Standardized rules for public play</a:t>
+            </a:r>
+          </a:p>
+          <a:p>
+            <a:pPr>
+              <a:defRPr sz="1800"/>
+            </a:pPr>
+            <a:r>
+              <a:t>Accessible and inclusive for all players</a:t>
             </a:r>
           </a:p>
         </p:txBody>
@@ -3357,7 +3137,7 @@
               <a:defRPr sz="3000"/>
             </a:pPr>
             <a:r>
-              <a:t>Key Elements of D🫰D Adventurers League</a:t>
+              <a:t>How Did It Contribute to Renewal?</a:t>
             </a:r>
           </a:p>
         </p:txBody>
@@ -3388,7 +3168,7 @@
               <a:defRPr sz="1800"/>
             </a:pPr>
             <a:r>
-              <a:t>Structured campaign with shared storylines</a:t>
+              <a:t>Community-building through local game stores</a:t>
             </a:r>
           </a:p>
           <a:p>
@@ -3396,7 +3176,7 @@
               <a:defRPr sz="1800"/>
             </a:pPr>
             <a:r>
-              <a:t>Official D&amp;D play supported by Wizards of the Coast</a:t>
+              <a:t>Engagement with players of all experience levels</a:t>
             </a:r>
           </a:p>
           <a:p>
@@ -3404,7 +3184,7 @@
               <a:defRPr sz="1800"/>
             </a:pPr>
             <a:r>
-              <a:t>Accessible to all players and DMs</a:t>
+              <a:t>Incorporation of official D&amp;D storylines</a:t>
             </a:r>
           </a:p>
         </p:txBody>
@@ -3436,7 +3216,7 @@
               <a:defRPr sz="2000"/>
             </a:pPr>
             <a:r>
-              <a:t>Benefits of D🫰D Adventurers League</a:t>
+              <a:t>Impact</a:t>
             </a:r>
           </a:p>
         </p:txBody>
@@ -3468,7 +3248,7 @@
               <a:defRPr sz="1800"/>
             </a:pPr>
             <a:r>
-              <a:t>Builds community and connection among players</a:t>
+              <a:t>Increased player engagement and retention</a:t>
             </a:r>
           </a:p>
           <a:p>
@@ -3476,7 +3256,7 @@
               <a:defRPr sz="1800"/>
             </a:pPr>
             <a:r>
-              <a:t>Promotes inclusivity and diversity</a:t>
+              <a:t>Expansion of game reach to new audiences</a:t>
             </a:r>
           </a:p>
           <a:p>
@@ -3484,73 +3264,7 @@
               <a:defRPr sz="1800"/>
             </a:pPr>
             <a:r>
-              <a:t>Encourages teamwork and cooperation</a:t>
-            </a:r>
-          </a:p>
-        </p:txBody>
-      </p:sp>
-    </p:spTree>
-  </p:cSld>
-  <p:clrMapOvr>
-    <a:masterClrMapping/>
-  </p:clrMapOvr>
-</p:sld>
-</file>
-
-<file path=ppt/slides/slide9.xml><?xml version="1.0" encoding="utf-8"?>
-<p:sld xmlns:a="http://schemas.openxmlformats.org/drawingml/2006/main" xmlns:p="http://schemas.openxmlformats.org/presentationml/2006/main" xmlns:r="http://schemas.openxmlformats.org/officeDocument/2006/relationships">
-  <p:cSld>
-    <p:spTree>
-      <p:nvGrpSpPr>
-        <p:cNvPr id="1" name=""/>
-        <p:cNvGrpSpPr/>
-        <p:nvPr/>
-      </p:nvGrpSpPr>
-      <p:grpSpPr/>
-      <p:sp>
-        <p:nvSpPr>
-          <p:cNvPr id="2" name="Title 1"/>
-          <p:cNvSpPr>
-            <a:spLocks noGrp="1"/>
-          </p:cNvSpPr>
-          <p:nvPr>
-            <p:ph type="title"/>
-          </p:nvPr>
-        </p:nvSpPr>
-        <p:spPr/>
-        <p:txBody>
-          <a:bodyPr/>
-          <a:lstStyle/>
-          <a:p>
-            <a:pPr>
-              <a:defRPr sz="4000"/>
-            </a:pPr>
-            <a:r>
-              <a:t>Impact on the Renewal of Interest in D🫰D</a:t>
-            </a:r>
-          </a:p>
-        </p:txBody>
-      </p:sp>
-      <p:sp>
-        <p:nvSpPr>
-          <p:cNvPr id="3" name="Text Placeholder 2"/>
-          <p:cNvSpPr>
-            <a:spLocks noGrp="1"/>
-          </p:cNvSpPr>
-          <p:nvPr>
-            <p:ph type="body" idx="1"/>
-          </p:nvPr>
-        </p:nvSpPr>
-        <p:spPr/>
-        <p:txBody>
-          <a:bodyPr/>
-          <a:lstStyle/>
-          <a:p>
-            <a:pPr>
-              <a:defRPr sz="2800"/>
-            </a:pPr>
-            <a:r>
-              <a:t>How D&amp;D Adventurers League revitalized the game</a:t>
+              <a:t>Promotion of social interaction and storytelling</a:t>
             </a:r>
           </a:p>
         </p:txBody>

</xml_diff>